<commit_message>
Updates with new projects
</commit_message>
<xml_diff>
--- a/CustomVisualsForPowerBI.pptx
+++ b/CustomVisualsForPowerBI.pptx
@@ -5,10 +5,10 @@
     <p:sldMasterId id="2147483648" r:id="rId5"/>
   </p:sldMasterIdLst>
   <p:notesMasterIdLst>
-    <p:notesMasterId r:id="rId38"/>
+    <p:notesMasterId r:id="rId41"/>
   </p:notesMasterIdLst>
   <p:handoutMasterIdLst>
-    <p:handoutMasterId r:id="rId39"/>
+    <p:handoutMasterId r:id="rId42"/>
   </p:handoutMasterIdLst>
   <p:sldIdLst>
     <p:sldId id="279" r:id="rId6"/>
@@ -35,14 +35,17 @@
     <p:sldId id="355" r:id="rId27"/>
     <p:sldId id="350" r:id="rId28"/>
     <p:sldId id="351" r:id="rId29"/>
-    <p:sldId id="352" r:id="rId30"/>
-    <p:sldId id="353" r:id="rId31"/>
-    <p:sldId id="359" r:id="rId32"/>
-    <p:sldId id="358" r:id="rId33"/>
-    <p:sldId id="357" r:id="rId34"/>
-    <p:sldId id="356" r:id="rId35"/>
-    <p:sldId id="354" r:id="rId36"/>
-    <p:sldId id="349" r:id="rId37"/>
+    <p:sldId id="360" r:id="rId30"/>
+    <p:sldId id="357" r:id="rId31"/>
+    <p:sldId id="361" r:id="rId32"/>
+    <p:sldId id="356" r:id="rId33"/>
+    <p:sldId id="358" r:id="rId34"/>
+    <p:sldId id="362" r:id="rId35"/>
+    <p:sldId id="359" r:id="rId36"/>
+    <p:sldId id="352" r:id="rId37"/>
+    <p:sldId id="353" r:id="rId38"/>
+    <p:sldId id="354" r:id="rId39"/>
+    <p:sldId id="349" r:id="rId40"/>
   </p:sldIdLst>
   <p:sldSz cx="9144000" cy="6858000" type="screen4x3"/>
   <p:notesSz cx="7315200" cy="9601200"/>
@@ -4974,6 +4977,1574 @@
       </p:grpSpPr>
       <p:sp>
         <p:nvSpPr>
+          <p:cNvPr id="2" name="Title 1"/>
+          <p:cNvSpPr>
+            <a:spLocks noGrp="1"/>
+          </p:cNvSpPr>
+          <p:nvPr>
+            <p:ph type="title"/>
+          </p:nvPr>
+        </p:nvSpPr>
+        <p:spPr/>
+        <p:txBody>
+          <a:bodyPr/>
+          <a:lstStyle/>
+          <a:p>
+            <a:r>
+              <a:rPr lang="en-US" dirty="0"/>
+              <a:t>Creating a New Custom Visual Project</a:t>
+            </a:r>
+          </a:p>
+        </p:txBody>
+      </p:sp>
+      <p:sp>
+        <p:nvSpPr>
+          <p:cNvPr id="4" name="Content Placeholder 3"/>
+          <p:cNvSpPr>
+            <a:spLocks noGrp="1"/>
+          </p:cNvSpPr>
+          <p:nvPr>
+            <p:ph idx="1"/>
+          </p:nvPr>
+        </p:nvSpPr>
+        <p:spPr/>
+        <p:txBody>
+          <a:bodyPr>
+            <a:normAutofit/>
+          </a:bodyPr>
+          <a:lstStyle/>
+          <a:p>
+            <a:r>
+              <a:rPr lang="en-US" sz="2400" dirty="0"/>
+              <a:t>Creating a new project</a:t>
+            </a:r>
+          </a:p>
+          <a:p>
+            <a:pPr marL="679450" lvl="2" indent="0">
+              <a:buNone/>
+            </a:pPr>
+            <a:r>
+              <a:rPr lang="en-US" sz="1800" b="1" dirty="0" err="1">
+                <a:solidFill>
+                  <a:schemeClr val="accent1">
+                    <a:lumMod val="50000"/>
+                  </a:schemeClr>
+                </a:solidFill>
+                <a:latin typeface="Lucida Console" panose="020B0609040504020204" pitchFamily="49" charset="0"/>
+              </a:rPr>
+              <a:t>pbiviz</a:t>
+            </a:r>
+            <a:r>
+              <a:rPr lang="en-US" sz="1800" b="1" dirty="0">
+                <a:solidFill>
+                  <a:schemeClr val="accent1">
+                    <a:lumMod val="50000"/>
+                  </a:schemeClr>
+                </a:solidFill>
+                <a:latin typeface="Lucida Console" panose="020B0609040504020204" pitchFamily="49" charset="0"/>
+              </a:rPr>
+              <a:t> new &lt;</a:t>
+            </a:r>
+            <a:r>
+              <a:rPr lang="en-US" sz="1800" b="1" dirty="0" err="1">
+                <a:solidFill>
+                  <a:schemeClr val="accent1">
+                    <a:lumMod val="50000"/>
+                  </a:schemeClr>
+                </a:solidFill>
+                <a:latin typeface="Lucida Console" panose="020B0609040504020204" pitchFamily="49" charset="0"/>
+              </a:rPr>
+              <a:t>ProjectName</a:t>
+            </a:r>
+            <a:r>
+              <a:rPr lang="en-US" sz="1800" b="1" dirty="0">
+                <a:solidFill>
+                  <a:schemeClr val="accent1">
+                    <a:lumMod val="50000"/>
+                  </a:schemeClr>
+                </a:solidFill>
+                <a:latin typeface="Lucida Console" panose="020B0609040504020204" pitchFamily="49" charset="0"/>
+              </a:rPr>
+              <a:t>&gt;</a:t>
+            </a:r>
+          </a:p>
+          <a:p>
+            <a:r>
+              <a:rPr lang="en-US" sz="2400" dirty="0"/>
+              <a:t>Open the Project with Visual Studio Code</a:t>
+            </a:r>
+          </a:p>
+          <a:p>
+            <a:pPr marL="679450" lvl="2" indent="0">
+              <a:buNone/>
+            </a:pPr>
+            <a:r>
+              <a:rPr lang="en-US" sz="1800" dirty="0">
+                <a:solidFill>
+                  <a:schemeClr val="accent1">
+                    <a:lumMod val="50000"/>
+                  </a:schemeClr>
+                </a:solidFill>
+                <a:latin typeface="Lucida Console" panose="020B0609040504020204" pitchFamily="49" charset="0"/>
+              </a:rPr>
+              <a:t>code .</a:t>
+            </a:r>
+          </a:p>
+        </p:txBody>
+      </p:sp>
+      <p:pic>
+        <p:nvPicPr>
+          <p:cNvPr id="3" name="Picture 2"/>
+          <p:cNvPicPr>
+            <a:picLocks noChangeAspect="1"/>
+          </p:cNvPicPr>
+          <p:nvPr/>
+        </p:nvPicPr>
+        <p:blipFill rotWithShape="1">
+          <a:blip r:embed="rId2"/>
+          <a:srcRect r="45159" b="50302"/>
+          <a:stretch/>
+        </p:blipFill>
+        <p:spPr>
+          <a:xfrm>
+            <a:off x="533400" y="3224212"/>
+            <a:ext cx="5715000" cy="3000375"/>
+          </a:xfrm>
+          <a:prstGeom prst="rect">
+            <a:avLst/>
+          </a:prstGeom>
+        </p:spPr>
+      </p:pic>
+      <p:grpSp>
+        <p:nvGrpSpPr>
+          <p:cNvPr id="7" name="Group 6"/>
+          <p:cNvGrpSpPr/>
+          <p:nvPr/>
+        </p:nvGrpSpPr>
+        <p:grpSpPr>
+          <a:xfrm>
+            <a:off x="2921726" y="3429000"/>
+            <a:ext cx="6069058" cy="3230880"/>
+            <a:chOff x="2921726" y="3429000"/>
+            <a:chExt cx="6069058" cy="3230880"/>
+          </a:xfrm>
+        </p:grpSpPr>
+        <p:pic>
+          <p:nvPicPr>
+            <p:cNvPr id="5" name="Picture 4"/>
+            <p:cNvPicPr>
+              <a:picLocks noChangeAspect="1"/>
+            </p:cNvPicPr>
+            <p:nvPr/>
+          </p:nvPicPr>
+          <p:blipFill>
+            <a:blip r:embed="rId3"/>
+            <a:stretch>
+              <a:fillRect/>
+            </a:stretch>
+          </p:blipFill>
+          <p:spPr>
+            <a:xfrm>
+              <a:off x="3976342" y="3429000"/>
+              <a:ext cx="5014442" cy="3230880"/>
+            </a:xfrm>
+            <a:prstGeom prst="rect">
+              <a:avLst/>
+            </a:prstGeom>
+          </p:spPr>
+        </p:pic>
+        <p:sp>
+          <p:nvSpPr>
+            <p:cNvPr id="6" name="Right Arrow 5"/>
+            <p:cNvSpPr/>
+            <p:nvPr/>
+          </p:nvSpPr>
+          <p:spPr>
+            <a:xfrm>
+              <a:off x="2921726" y="4846320"/>
+              <a:ext cx="762000" cy="320040"/>
+            </a:xfrm>
+            <a:prstGeom prst="rightArrow">
+              <a:avLst/>
+            </a:prstGeom>
+            <a:solidFill>
+              <a:schemeClr val="accent2"/>
+            </a:solidFill>
+            <a:ln>
+              <a:solidFill>
+                <a:schemeClr val="accent1">
+                  <a:lumMod val="50000"/>
+                </a:schemeClr>
+              </a:solidFill>
+            </a:ln>
+          </p:spPr>
+          <p:style>
+            <a:lnRef idx="2">
+              <a:schemeClr val="accent1">
+                <a:shade val="50000"/>
+              </a:schemeClr>
+            </a:lnRef>
+            <a:fillRef idx="1">
+              <a:schemeClr val="accent1"/>
+            </a:fillRef>
+            <a:effectRef idx="0">
+              <a:schemeClr val="accent1"/>
+            </a:effectRef>
+            <a:fontRef idx="minor">
+              <a:schemeClr val="lt1"/>
+            </a:fontRef>
+          </p:style>
+          <p:txBody>
+            <a:bodyPr rtlCol="0" anchor="ctr"/>
+            <a:lstStyle/>
+            <a:p>
+              <a:pPr algn="ctr"/>
+              <a:endParaRPr lang="en-US"/>
+            </a:p>
+          </p:txBody>
+        </p:sp>
+      </p:grpSp>
+    </p:spTree>
+    <p:extLst>
+      <p:ext uri="{BB962C8B-B14F-4D97-AF65-F5344CB8AC3E}">
+        <p14:creationId xmlns:p14="http://schemas.microsoft.com/office/powerpoint/2010/main" val="1317821016"/>
+      </p:ext>
+    </p:extLst>
+  </p:cSld>
+  <p:clrMapOvr>
+    <a:masterClrMapping/>
+  </p:clrMapOvr>
+  <p:timing>
+    <p:tnLst>
+      <p:par>
+        <p:cTn id="1" dur="indefinite" restart="never" nodeType="tmRoot">
+          <p:childTnLst>
+            <p:seq concurrent="1" nextAc="seek">
+              <p:cTn id="2" dur="indefinite" nodeType="mainSeq">
+                <p:childTnLst>
+                  <p:par>
+                    <p:cTn id="3" fill="hold">
+                      <p:stCondLst>
+                        <p:cond delay="indefinite"/>
+                      </p:stCondLst>
+                      <p:childTnLst>
+                        <p:par>
+                          <p:cTn id="4" fill="hold">
+                            <p:stCondLst>
+                              <p:cond delay="0"/>
+                            </p:stCondLst>
+                            <p:childTnLst>
+                              <p:par>
+                                <p:cTn id="5" presetID="22" presetClass="entr" presetSubtype="8" fill="hold" nodeType="clickEffect">
+                                  <p:stCondLst>
+                                    <p:cond delay="0"/>
+                                  </p:stCondLst>
+                                  <p:childTnLst>
+                                    <p:set>
+                                      <p:cBhvr>
+                                        <p:cTn id="6" dur="1" fill="hold">
+                                          <p:stCondLst>
+                                            <p:cond delay="0"/>
+                                          </p:stCondLst>
+                                        </p:cTn>
+                                        <p:tgtEl>
+                                          <p:spTgt spid="7"/>
+                                        </p:tgtEl>
+                                        <p:attrNameLst>
+                                          <p:attrName>style.visibility</p:attrName>
+                                        </p:attrNameLst>
+                                      </p:cBhvr>
+                                      <p:to>
+                                        <p:strVal val="visible"/>
+                                      </p:to>
+                                    </p:set>
+                                    <p:animEffect transition="in" filter="wipe(left)">
+                                      <p:cBhvr>
+                                        <p:cTn id="7" dur="500"/>
+                                        <p:tgtEl>
+                                          <p:spTgt spid="7"/>
+                                        </p:tgtEl>
+                                      </p:cBhvr>
+                                    </p:animEffect>
+                                  </p:childTnLst>
+                                </p:cTn>
+                              </p:par>
+                            </p:childTnLst>
+                          </p:cTn>
+                        </p:par>
+                      </p:childTnLst>
+                    </p:cTn>
+                  </p:par>
+                </p:childTnLst>
+              </p:cTn>
+              <p:prevCondLst>
+                <p:cond evt="onPrev" delay="0">
+                  <p:tgtEl>
+                    <p:sldTgt/>
+                  </p:tgtEl>
+                </p:cond>
+              </p:prevCondLst>
+              <p:nextCondLst>
+                <p:cond evt="onNext" delay="0">
+                  <p:tgtEl>
+                    <p:sldTgt/>
+                  </p:tgtEl>
+                </p:cond>
+              </p:nextCondLst>
+            </p:seq>
+          </p:childTnLst>
+        </p:cTn>
+      </p:par>
+    </p:tnLst>
+  </p:timing>
+</p:sld>
+</file>
+
+<file path=ppt/slides/slide26.xml><?xml version="1.0" encoding="utf-8"?>
+<p:sld xmlns:a="http://schemas.openxmlformats.org/drawingml/2006/main" xmlns:r="http://schemas.openxmlformats.org/officeDocument/2006/relationships" xmlns:p="http://schemas.openxmlformats.org/presentationml/2006/main">
+  <p:cSld>
+    <p:spTree>
+      <p:nvGrpSpPr>
+        <p:cNvPr id="1" name=""/>
+        <p:cNvGrpSpPr/>
+        <p:nvPr/>
+      </p:nvGrpSpPr>
+      <p:grpSpPr>
+        <a:xfrm>
+          <a:off x="0" y="0"/>
+          <a:ext cx="0" cy="0"/>
+          <a:chOff x="0" y="0"/>
+          <a:chExt cx="0" cy="0"/>
+        </a:xfrm>
+      </p:grpSpPr>
+      <p:sp>
+        <p:nvSpPr>
+          <p:cNvPr id="2" name="Title 1"/>
+          <p:cNvSpPr>
+            <a:spLocks noGrp="1"/>
+          </p:cNvSpPr>
+          <p:nvPr>
+            <p:ph type="title"/>
+          </p:nvPr>
+        </p:nvSpPr>
+        <p:spPr/>
+        <p:txBody>
+          <a:bodyPr/>
+          <a:lstStyle/>
+          <a:p>
+            <a:r>
+              <a:rPr lang="en-US" dirty="0"/>
+              <a:t>Files in the new project</a:t>
+            </a:r>
+          </a:p>
+        </p:txBody>
+      </p:sp>
+      <p:sp>
+        <p:nvSpPr>
+          <p:cNvPr id="3" name="Content Placeholder 2"/>
+          <p:cNvSpPr>
+            <a:spLocks noGrp="1"/>
+          </p:cNvSpPr>
+          <p:nvPr>
+            <p:ph idx="1"/>
+          </p:nvPr>
+        </p:nvSpPr>
+        <p:spPr/>
+        <p:txBody>
+          <a:bodyPr>
+            <a:normAutofit fontScale="92500" lnSpcReduction="10000"/>
+          </a:bodyPr>
+          <a:lstStyle/>
+          <a:p>
+            <a:r>
+              <a:rPr lang="en-US" dirty="0" err="1"/>
+              <a:t>gitignore</a:t>
+            </a:r>
+            <a:endParaRPr lang="en-US" dirty="0"/>
+          </a:p>
+          <a:p>
+            <a:pPr lvl="1"/>
+            <a:r>
+              <a:rPr lang="en-US" dirty="0"/>
+              <a:t>tells </a:t>
+            </a:r>
+            <a:r>
+              <a:rPr lang="en-US" dirty="0" err="1"/>
+              <a:t>git</a:t>
+            </a:r>
+            <a:r>
+              <a:rPr lang="en-US" dirty="0"/>
+              <a:t> to ignore files that shouldn't be tracked in the repository</a:t>
+            </a:r>
+          </a:p>
+          <a:p>
+            <a:r>
+              <a:rPr lang="en-US" dirty="0" err="1"/>
+              <a:t>capabilities.json</a:t>
+            </a:r>
+            <a:endParaRPr lang="en-US" dirty="0"/>
+          </a:p>
+          <a:p>
+            <a:pPr lvl="1"/>
+            <a:r>
+              <a:rPr lang="en-US" dirty="0"/>
+              <a:t>used to define the capabilities of your visual learn more about visual capabilities</a:t>
+            </a:r>
+          </a:p>
+          <a:p>
+            <a:r>
+              <a:rPr lang="en-US" dirty="0" err="1"/>
+              <a:t>package.json</a:t>
+            </a:r>
+            <a:endParaRPr lang="en-US" dirty="0"/>
+          </a:p>
+          <a:p>
+            <a:pPr lvl="1"/>
+            <a:r>
+              <a:rPr lang="en-US" dirty="0"/>
+              <a:t>Used by </a:t>
+            </a:r>
+            <a:r>
+              <a:rPr lang="en-US" dirty="0" err="1"/>
+              <a:t>npm</a:t>
+            </a:r>
+            <a:r>
+              <a:rPr lang="en-US" dirty="0"/>
+              <a:t> to manage modules learn more about </a:t>
+            </a:r>
+            <a:r>
+              <a:rPr lang="en-US" dirty="0" err="1"/>
+              <a:t>npm</a:t>
+            </a:r>
+            <a:endParaRPr lang="en-US" dirty="0"/>
+          </a:p>
+          <a:p>
+            <a:r>
+              <a:rPr lang="en-US" dirty="0" err="1"/>
+              <a:t>pbiviz.json</a:t>
+            </a:r>
+            <a:endParaRPr lang="en-US" dirty="0"/>
+          </a:p>
+          <a:p>
+            <a:pPr lvl="1"/>
+            <a:r>
+              <a:rPr lang="en-US" dirty="0"/>
+              <a:t>Main configuration file for your visual</a:t>
+            </a:r>
+          </a:p>
+          <a:p>
+            <a:r>
+              <a:rPr lang="en-US" dirty="0" err="1"/>
+              <a:t>tsconfig.json</a:t>
+            </a:r>
+            <a:endParaRPr lang="en-US" dirty="0"/>
+          </a:p>
+          <a:p>
+            <a:pPr lvl="1"/>
+            <a:r>
+              <a:rPr lang="en-US" dirty="0"/>
+              <a:t>Typescript compiler settings learn more about </a:t>
+            </a:r>
+            <a:r>
+              <a:rPr lang="en-US" dirty="0" err="1"/>
+              <a:t>tsconfig</a:t>
+            </a:r>
+            <a:endParaRPr lang="en-US" dirty="0"/>
+          </a:p>
+        </p:txBody>
+      </p:sp>
+    </p:spTree>
+    <p:extLst>
+      <p:ext uri="{BB962C8B-B14F-4D97-AF65-F5344CB8AC3E}">
+        <p14:creationId xmlns:p14="http://schemas.microsoft.com/office/powerpoint/2010/main" val="3834822213"/>
+      </p:ext>
+    </p:extLst>
+  </p:cSld>
+  <p:clrMapOvr>
+    <a:masterClrMapping/>
+  </p:clrMapOvr>
+</p:sld>
+</file>
+
+<file path=ppt/slides/slide27.xml><?xml version="1.0" encoding="utf-8"?>
+<p:sld xmlns:a="http://schemas.openxmlformats.org/drawingml/2006/main" xmlns:r="http://schemas.openxmlformats.org/officeDocument/2006/relationships" xmlns:p="http://schemas.openxmlformats.org/presentationml/2006/main">
+  <p:cSld>
+    <p:spTree>
+      <p:nvGrpSpPr>
+        <p:cNvPr id="1" name=""/>
+        <p:cNvGrpSpPr/>
+        <p:nvPr/>
+      </p:nvGrpSpPr>
+      <p:grpSpPr>
+        <a:xfrm>
+          <a:off x="0" y="0"/>
+          <a:ext cx="0" cy="0"/>
+          <a:chOff x="0" y="0"/>
+          <a:chExt cx="0" cy="0"/>
+        </a:xfrm>
+      </p:grpSpPr>
+      <p:sp>
+        <p:nvSpPr>
+          <p:cNvPr id="2" name="Title 1"/>
+          <p:cNvSpPr>
+            <a:spLocks noGrp="1"/>
+          </p:cNvSpPr>
+          <p:nvPr>
+            <p:ph type="title"/>
+          </p:nvPr>
+        </p:nvSpPr>
+        <p:spPr/>
+        <p:txBody>
+          <a:bodyPr/>
+          <a:lstStyle/>
+          <a:p>
+            <a:r>
+              <a:rPr lang="en-US" dirty="0"/>
+              <a:t>The </a:t>
+            </a:r>
+            <a:r>
+              <a:rPr lang="en-US" dirty="0" err="1"/>
+              <a:t>pbiviz.json</a:t>
+            </a:r>
+            <a:r>
+              <a:rPr lang="en-US" dirty="0"/>
+              <a:t> File</a:t>
+            </a:r>
+          </a:p>
+        </p:txBody>
+      </p:sp>
+      <p:pic>
+        <p:nvPicPr>
+          <p:cNvPr id="3" name="Picture 2"/>
+          <p:cNvPicPr>
+            <a:picLocks noChangeAspect="1"/>
+          </p:cNvPicPr>
+          <p:nvPr/>
+        </p:nvPicPr>
+        <p:blipFill>
+          <a:blip r:embed="rId2"/>
+          <a:stretch>
+            <a:fillRect/>
+          </a:stretch>
+        </p:blipFill>
+        <p:spPr>
+          <a:xfrm>
+            <a:off x="457200" y="1676400"/>
+            <a:ext cx="7472363" cy="4237708"/>
+          </a:xfrm>
+          <a:prstGeom prst="rect">
+            <a:avLst/>
+          </a:prstGeom>
+          <a:ln>
+            <a:solidFill>
+              <a:schemeClr val="tx1"/>
+            </a:solidFill>
+          </a:ln>
+        </p:spPr>
+      </p:pic>
+    </p:spTree>
+    <p:extLst>
+      <p:ext uri="{BB962C8B-B14F-4D97-AF65-F5344CB8AC3E}">
+        <p14:creationId xmlns:p14="http://schemas.microsoft.com/office/powerpoint/2010/main" val="4018350027"/>
+      </p:ext>
+    </p:extLst>
+  </p:cSld>
+  <p:clrMapOvr>
+    <a:masterClrMapping/>
+  </p:clrMapOvr>
+</p:sld>
+</file>
+
+<file path=ppt/slides/slide28.xml><?xml version="1.0" encoding="utf-8"?>
+<p:sld xmlns:a="http://schemas.openxmlformats.org/drawingml/2006/main" xmlns:r="http://schemas.openxmlformats.org/officeDocument/2006/relationships" xmlns:p="http://schemas.openxmlformats.org/presentationml/2006/main">
+  <p:cSld>
+    <p:spTree>
+      <p:nvGrpSpPr>
+        <p:cNvPr id="1" name=""/>
+        <p:cNvGrpSpPr/>
+        <p:nvPr/>
+      </p:nvGrpSpPr>
+      <p:grpSpPr>
+        <a:xfrm>
+          <a:off x="0" y="0"/>
+          <a:ext cx="0" cy="0"/>
+          <a:chOff x="0" y="0"/>
+          <a:chExt cx="0" cy="0"/>
+        </a:xfrm>
+      </p:grpSpPr>
+      <p:sp>
+        <p:nvSpPr>
+          <p:cNvPr id="2" name="Title 1"/>
+          <p:cNvSpPr>
+            <a:spLocks noGrp="1"/>
+          </p:cNvSpPr>
+          <p:nvPr>
+            <p:ph type="title"/>
+          </p:nvPr>
+        </p:nvSpPr>
+        <p:spPr/>
+        <p:txBody>
+          <a:bodyPr/>
+          <a:lstStyle/>
+          <a:p>
+            <a:r>
+              <a:rPr lang="en-US" dirty="0"/>
+              <a:t>Folders in the new project</a:t>
+            </a:r>
+          </a:p>
+        </p:txBody>
+      </p:sp>
+      <p:sp>
+        <p:nvSpPr>
+          <p:cNvPr id="3" name="Content Placeholder 2"/>
+          <p:cNvSpPr>
+            <a:spLocks noGrp="1"/>
+          </p:cNvSpPr>
+          <p:nvPr>
+            <p:ph idx="1"/>
+          </p:nvPr>
+        </p:nvSpPr>
+        <p:spPr/>
+        <p:txBody>
+          <a:bodyPr>
+            <a:normAutofit/>
+          </a:bodyPr>
+          <a:lstStyle/>
+          <a:p>
+            <a:r>
+              <a:rPr lang="en-US" dirty="0"/>
+              <a:t>assets/</a:t>
+            </a:r>
+          </a:p>
+          <a:p>
+            <a:pPr lvl="1"/>
+            <a:r>
+              <a:rPr lang="en-US" dirty="0"/>
+              <a:t>Used to store visual assets (icon, screenshots, </a:t>
+            </a:r>
+            <a:r>
+              <a:rPr lang="en-US" dirty="0" err="1"/>
+              <a:t>etc</a:t>
+            </a:r>
+            <a:r>
+              <a:rPr lang="en-US" dirty="0"/>
+              <a:t>)</a:t>
+            </a:r>
+          </a:p>
+          <a:p>
+            <a:r>
+              <a:rPr lang="en-US" dirty="0" err="1"/>
+              <a:t>dist</a:t>
+            </a:r>
+            <a:r>
+              <a:rPr lang="en-US" dirty="0"/>
+              <a:t>/</a:t>
+            </a:r>
+          </a:p>
+          <a:p>
+            <a:pPr lvl="1"/>
+            <a:r>
+              <a:rPr lang="en-US" dirty="0"/>
+              <a:t>when you run </a:t>
+            </a:r>
+            <a:r>
+              <a:rPr lang="en-US" dirty="0" err="1"/>
+              <a:t>pbiviz</a:t>
+            </a:r>
+            <a:r>
+              <a:rPr lang="en-US" dirty="0"/>
+              <a:t> package the </a:t>
+            </a:r>
+            <a:r>
+              <a:rPr lang="en-US" dirty="0" err="1"/>
+              <a:t>pbiviz</a:t>
+            </a:r>
+            <a:r>
+              <a:rPr lang="en-US" dirty="0"/>
+              <a:t> file will be generated here</a:t>
+            </a:r>
+          </a:p>
+          <a:p>
+            <a:r>
+              <a:rPr lang="en-US" dirty="0" err="1"/>
+              <a:t>src</a:t>
+            </a:r>
+            <a:r>
+              <a:rPr lang="en-US" dirty="0"/>
+              <a:t>/</a:t>
+            </a:r>
+          </a:p>
+          <a:p>
+            <a:pPr lvl="1"/>
+            <a:r>
+              <a:rPr lang="en-US" dirty="0"/>
+              <a:t>Typescript code for your visual goes here</a:t>
+            </a:r>
+          </a:p>
+          <a:p>
+            <a:r>
+              <a:rPr lang="en-US" dirty="0"/>
+              <a:t>style/</a:t>
+            </a:r>
+          </a:p>
+          <a:p>
+            <a:pPr lvl="1"/>
+            <a:r>
+              <a:rPr lang="en-US" dirty="0"/>
+              <a:t>Less styles for your visual go here</a:t>
+            </a:r>
+          </a:p>
+        </p:txBody>
+      </p:sp>
+    </p:spTree>
+    <p:extLst>
+      <p:ext uri="{BB962C8B-B14F-4D97-AF65-F5344CB8AC3E}">
+        <p14:creationId xmlns:p14="http://schemas.microsoft.com/office/powerpoint/2010/main" val="2804769379"/>
+      </p:ext>
+    </p:extLst>
+  </p:cSld>
+  <p:clrMapOvr>
+    <a:masterClrMapping/>
+  </p:clrMapOvr>
+</p:sld>
+</file>
+
+<file path=ppt/slides/slide29.xml><?xml version="1.0" encoding="utf-8"?>
+<p:sld xmlns:a="http://schemas.openxmlformats.org/drawingml/2006/main" xmlns:r="http://schemas.openxmlformats.org/officeDocument/2006/relationships" xmlns:p="http://schemas.openxmlformats.org/presentationml/2006/main">
+  <p:cSld>
+    <p:spTree>
+      <p:nvGrpSpPr>
+        <p:cNvPr id="1" name=""/>
+        <p:cNvGrpSpPr/>
+        <p:nvPr/>
+      </p:nvGrpSpPr>
+      <p:grpSpPr>
+        <a:xfrm>
+          <a:off x="0" y="0"/>
+          <a:ext cx="0" cy="0"/>
+          <a:chOff x="0" y="0"/>
+          <a:chExt cx="0" cy="0"/>
+        </a:xfrm>
+      </p:grpSpPr>
+      <p:sp>
+        <p:nvSpPr>
+          <p:cNvPr id="2" name="Title 1"/>
+          <p:cNvSpPr>
+            <a:spLocks noGrp="1"/>
+          </p:cNvSpPr>
+          <p:nvPr>
+            <p:ph type="title"/>
+          </p:nvPr>
+        </p:nvSpPr>
+        <p:spPr/>
+        <p:txBody>
+          <a:bodyPr/>
+          <a:lstStyle/>
+          <a:p>
+            <a:r>
+              <a:rPr lang="en-US" dirty="0"/>
+              <a:t>Installing Typings for D3 using </a:t>
+            </a:r>
+            <a:r>
+              <a:rPr lang="en-US" dirty="0" err="1"/>
+              <a:t>npm</a:t>
+            </a:r>
+            <a:endParaRPr lang="en-US" dirty="0"/>
+          </a:p>
+        </p:txBody>
+      </p:sp>
+      <p:sp>
+        <p:nvSpPr>
+          <p:cNvPr id="3" name="Content Placeholder 2"/>
+          <p:cNvSpPr>
+            <a:spLocks noGrp="1"/>
+          </p:cNvSpPr>
+          <p:nvPr>
+            <p:ph idx="1"/>
+          </p:nvPr>
+        </p:nvSpPr>
+        <p:spPr/>
+        <p:txBody>
+          <a:bodyPr>
+            <a:normAutofit/>
+          </a:bodyPr>
+          <a:lstStyle/>
+          <a:p>
+            <a:r>
+              <a:rPr lang="en-US" sz="2400" dirty="0"/>
+              <a:t>Installing </a:t>
+            </a:r>
+            <a:r>
+              <a:rPr lang="en-US" sz="2400" dirty="0" err="1"/>
+              <a:t>typings</a:t>
+            </a:r>
+            <a:r>
+              <a:rPr lang="en-US" sz="2400" dirty="0"/>
+              <a:t> support using Node Package Manage</a:t>
+            </a:r>
+          </a:p>
+          <a:p>
+            <a:pPr lvl="1"/>
+            <a:r>
+              <a:rPr lang="en-US" sz="2000" dirty="0"/>
+              <a:t>Start by installing global support for </a:t>
+            </a:r>
+            <a:r>
+              <a:rPr lang="en-US" sz="2000" dirty="0" err="1"/>
+              <a:t>typings</a:t>
+            </a:r>
+            <a:endParaRPr lang="en-US" sz="2000" dirty="0"/>
+          </a:p>
+          <a:p>
+            <a:pPr marL="679450" lvl="2" indent="0">
+              <a:buNone/>
+            </a:pPr>
+            <a:r>
+              <a:rPr lang="en-US" sz="1800" b="1" dirty="0" err="1">
+                <a:solidFill>
+                  <a:schemeClr val="accent1">
+                    <a:lumMod val="50000"/>
+                  </a:schemeClr>
+                </a:solidFill>
+              </a:rPr>
+              <a:t>npm</a:t>
+            </a:r>
+            <a:r>
+              <a:rPr lang="en-US" sz="1800" b="1" dirty="0">
+                <a:solidFill>
+                  <a:schemeClr val="accent1">
+                    <a:lumMod val="50000"/>
+                  </a:schemeClr>
+                </a:solidFill>
+              </a:rPr>
+              <a:t> install </a:t>
+            </a:r>
+            <a:r>
+              <a:rPr lang="en-US" sz="1800" b="1" dirty="0" err="1">
+                <a:solidFill>
+                  <a:schemeClr val="accent1">
+                    <a:lumMod val="50000"/>
+                  </a:schemeClr>
+                </a:solidFill>
+              </a:rPr>
+              <a:t>typings</a:t>
+            </a:r>
+            <a:r>
+              <a:rPr lang="en-US" sz="1800" b="1" dirty="0">
+                <a:solidFill>
+                  <a:schemeClr val="accent1">
+                    <a:lumMod val="50000"/>
+                  </a:schemeClr>
+                </a:solidFill>
+              </a:rPr>
+              <a:t> –g</a:t>
+            </a:r>
+          </a:p>
+          <a:p>
+            <a:pPr lvl="1"/>
+            <a:r>
+              <a:rPr lang="en-US" sz="2000" dirty="0"/>
+              <a:t>Install </a:t>
+            </a:r>
+            <a:r>
+              <a:rPr lang="en-US" sz="2000" dirty="0" err="1"/>
+              <a:t>typings</a:t>
+            </a:r>
+            <a:r>
+              <a:rPr lang="en-US" sz="2000" dirty="0"/>
+              <a:t> for specific JavaScript libraries</a:t>
+            </a:r>
+          </a:p>
+          <a:p>
+            <a:pPr marL="679450" lvl="2" indent="0">
+              <a:buNone/>
+            </a:pPr>
+            <a:r>
+              <a:rPr lang="en-US" sz="1800" b="1" dirty="0" err="1">
+                <a:solidFill>
+                  <a:schemeClr val="accent1">
+                    <a:lumMod val="50000"/>
+                  </a:schemeClr>
+                </a:solidFill>
+              </a:rPr>
+              <a:t>typings</a:t>
+            </a:r>
+            <a:r>
+              <a:rPr lang="en-US" sz="1800" b="1" dirty="0">
+                <a:solidFill>
+                  <a:schemeClr val="accent1">
+                    <a:lumMod val="50000"/>
+                  </a:schemeClr>
+                </a:solidFill>
+              </a:rPr>
+              <a:t> install --save --global </a:t>
+            </a:r>
+            <a:r>
+              <a:rPr lang="en-US" sz="1800" b="1" dirty="0" err="1">
+                <a:solidFill>
+                  <a:schemeClr val="accent1">
+                    <a:lumMod val="50000"/>
+                  </a:schemeClr>
+                </a:solidFill>
+              </a:rPr>
+              <a:t>dt~jquery</a:t>
+            </a:r>
+            <a:endParaRPr lang="en-US" sz="1800" b="1" dirty="0">
+              <a:solidFill>
+                <a:schemeClr val="accent1">
+                  <a:lumMod val="50000"/>
+                </a:schemeClr>
+              </a:solidFill>
+            </a:endParaRPr>
+          </a:p>
+          <a:p>
+            <a:pPr marL="679450" lvl="2" indent="0">
+              <a:buNone/>
+            </a:pPr>
+            <a:r>
+              <a:rPr lang="en-US" sz="1800" b="1" dirty="0" err="1">
+                <a:solidFill>
+                  <a:schemeClr val="accent1">
+                    <a:lumMod val="50000"/>
+                  </a:schemeClr>
+                </a:solidFill>
+              </a:rPr>
+              <a:t>typings</a:t>
+            </a:r>
+            <a:r>
+              <a:rPr lang="en-US" sz="1800" b="1" dirty="0">
+                <a:solidFill>
+                  <a:schemeClr val="accent1">
+                    <a:lumMod val="50000"/>
+                  </a:schemeClr>
+                </a:solidFill>
+              </a:rPr>
+              <a:t> install --save --global dt~d3</a:t>
+            </a:r>
+          </a:p>
+        </p:txBody>
+      </p:sp>
+      <p:pic>
+        <p:nvPicPr>
+          <p:cNvPr id="4" name="Picture 3"/>
+          <p:cNvPicPr>
+            <a:picLocks noChangeAspect="1"/>
+          </p:cNvPicPr>
+          <p:nvPr/>
+        </p:nvPicPr>
+        <p:blipFill rotWithShape="1">
+          <a:blip r:embed="rId2"/>
+          <a:srcRect r="38638" b="52224"/>
+          <a:stretch/>
+        </p:blipFill>
+        <p:spPr>
+          <a:xfrm>
+            <a:off x="1143000" y="3810000"/>
+            <a:ext cx="5912746" cy="2667000"/>
+          </a:xfrm>
+          <a:prstGeom prst="rect">
+            <a:avLst/>
+          </a:prstGeom>
+        </p:spPr>
+      </p:pic>
+    </p:spTree>
+    <p:extLst>
+      <p:ext uri="{BB962C8B-B14F-4D97-AF65-F5344CB8AC3E}">
+        <p14:creationId xmlns:p14="http://schemas.microsoft.com/office/powerpoint/2010/main" val="2493262635"/>
+      </p:ext>
+    </p:extLst>
+  </p:cSld>
+  <p:clrMapOvr>
+    <a:masterClrMapping/>
+  </p:clrMapOvr>
+</p:sld>
+</file>
+
+<file path=ppt/slides/slide3.xml><?xml version="1.0" encoding="utf-8"?>
+<p:sld xmlns:a="http://schemas.openxmlformats.org/drawingml/2006/main" xmlns:r="http://schemas.openxmlformats.org/officeDocument/2006/relationships" xmlns:p="http://schemas.openxmlformats.org/presentationml/2006/main">
+  <p:cSld>
+    <p:spTree>
+      <p:nvGrpSpPr>
+        <p:cNvPr id="1" name=""/>
+        <p:cNvGrpSpPr/>
+        <p:nvPr/>
+      </p:nvGrpSpPr>
+      <p:grpSpPr>
+        <a:xfrm>
+          <a:off x="0" y="0"/>
+          <a:ext cx="0" cy="0"/>
+          <a:chOff x="0" y="0"/>
+          <a:chExt cx="0" cy="0"/>
+        </a:xfrm>
+      </p:grpSpPr>
+      <p:sp>
+        <p:nvSpPr>
+          <p:cNvPr id="2" name="Title 1"/>
+          <p:cNvSpPr>
+            <a:spLocks noGrp="1"/>
+          </p:cNvSpPr>
+          <p:nvPr>
+            <p:ph type="title"/>
+          </p:nvPr>
+        </p:nvSpPr>
+        <p:spPr/>
+        <p:txBody>
+          <a:bodyPr/>
+          <a:lstStyle/>
+          <a:p>
+            <a:r>
+              <a:rPr lang="en-US" dirty="0"/>
+              <a:t>Built-in Visualization Types</a:t>
+            </a:r>
+          </a:p>
+        </p:txBody>
+      </p:sp>
+      <p:sp>
+        <p:nvSpPr>
+          <p:cNvPr id="3" name="Content Placeholder 2"/>
+          <p:cNvSpPr>
+            <a:spLocks noGrp="1"/>
+          </p:cNvSpPr>
+          <p:nvPr>
+            <p:ph idx="1"/>
+          </p:nvPr>
+        </p:nvSpPr>
+        <p:spPr>
+          <a:xfrm>
+            <a:off x="533400" y="1295400"/>
+            <a:ext cx="4114800" cy="5257801"/>
+          </a:xfrm>
+        </p:spPr>
+        <p:txBody>
+          <a:bodyPr>
+            <a:noAutofit/>
+          </a:bodyPr>
+          <a:lstStyle/>
+          <a:p>
+            <a:pPr marL="182880">
+              <a:spcBef>
+                <a:spcPts val="200"/>
+              </a:spcBef>
+            </a:pPr>
+            <a:r>
+              <a:rPr lang="en-US" sz="2000" dirty="0"/>
+              <a:t>Table and Matrix</a:t>
+            </a:r>
+          </a:p>
+          <a:p>
+            <a:pPr marL="182880">
+              <a:spcBef>
+                <a:spcPts val="200"/>
+              </a:spcBef>
+            </a:pPr>
+            <a:r>
+              <a:rPr lang="en-US" sz="2000" dirty="0"/>
+              <a:t>Bar charts and Column charts</a:t>
+            </a:r>
+          </a:p>
+          <a:p>
+            <a:pPr marL="182880">
+              <a:spcBef>
+                <a:spcPts val="200"/>
+              </a:spcBef>
+            </a:pPr>
+            <a:r>
+              <a:rPr lang="en-US" sz="2000" dirty="0"/>
+              <a:t>Pie charts and Doughnut chart</a:t>
+            </a:r>
+          </a:p>
+          <a:p>
+            <a:pPr marL="182880">
+              <a:spcBef>
+                <a:spcPts val="200"/>
+              </a:spcBef>
+            </a:pPr>
+            <a:r>
+              <a:rPr lang="en-US" sz="2000" dirty="0"/>
+              <a:t>Line chart and Area chart</a:t>
+            </a:r>
+          </a:p>
+          <a:p>
+            <a:pPr marL="182880">
+              <a:spcBef>
+                <a:spcPts val="200"/>
+              </a:spcBef>
+            </a:pPr>
+            <a:r>
+              <a:rPr lang="en-US" sz="2000" dirty="0"/>
+              <a:t>Scatter chart and Combo charts</a:t>
+            </a:r>
+          </a:p>
+          <a:p>
+            <a:pPr marL="182880">
+              <a:spcBef>
+                <a:spcPts val="200"/>
+              </a:spcBef>
+            </a:pPr>
+            <a:r>
+              <a:rPr lang="en-US" sz="2000" dirty="0"/>
+              <a:t>Card and Multi-row Card</a:t>
+            </a:r>
+          </a:p>
+          <a:p>
+            <a:pPr marL="182880">
+              <a:spcBef>
+                <a:spcPts val="200"/>
+              </a:spcBef>
+            </a:pPr>
+            <a:r>
+              <a:rPr lang="en-US" sz="2000" dirty="0" err="1"/>
+              <a:t>Treemap</a:t>
+            </a:r>
+            <a:endParaRPr lang="en-US" sz="2000" dirty="0"/>
+          </a:p>
+          <a:p>
+            <a:pPr marL="182880">
+              <a:spcBef>
+                <a:spcPts val="200"/>
+              </a:spcBef>
+            </a:pPr>
+            <a:r>
+              <a:rPr lang="en-US" sz="2000" dirty="0"/>
+              <a:t>Waterfall charts</a:t>
+            </a:r>
+          </a:p>
+          <a:p>
+            <a:pPr marL="182880">
+              <a:spcBef>
+                <a:spcPts val="200"/>
+              </a:spcBef>
+            </a:pPr>
+            <a:r>
+              <a:rPr lang="en-US" sz="2000" dirty="0"/>
+              <a:t>Funnel charts</a:t>
+            </a:r>
+          </a:p>
+          <a:p>
+            <a:pPr marL="182880">
+              <a:spcBef>
+                <a:spcPts val="200"/>
+              </a:spcBef>
+            </a:pPr>
+            <a:r>
+              <a:rPr lang="en-US" sz="2000" dirty="0"/>
+              <a:t>Gauge charts</a:t>
+            </a:r>
+          </a:p>
+          <a:p>
+            <a:pPr marL="182880">
+              <a:spcBef>
+                <a:spcPts val="200"/>
+              </a:spcBef>
+            </a:pPr>
+            <a:r>
+              <a:rPr lang="en-US" sz="2000" dirty="0"/>
+              <a:t>Map and Filled Map</a:t>
+            </a:r>
+          </a:p>
+          <a:p>
+            <a:pPr marL="182880">
+              <a:spcBef>
+                <a:spcPts val="200"/>
+              </a:spcBef>
+            </a:pPr>
+            <a:r>
+              <a:rPr lang="en-US" sz="2000" dirty="0"/>
+              <a:t>Slicer</a:t>
+            </a:r>
+          </a:p>
+          <a:p>
+            <a:pPr marL="182880">
+              <a:spcBef>
+                <a:spcPts val="200"/>
+              </a:spcBef>
+            </a:pPr>
+            <a:r>
+              <a:rPr lang="en-US" sz="2000" dirty="0"/>
+              <a:t>R script visual</a:t>
+            </a:r>
+          </a:p>
+          <a:p>
+            <a:pPr marL="182880">
+              <a:spcBef>
+                <a:spcPts val="200"/>
+              </a:spcBef>
+            </a:pPr>
+            <a:r>
+              <a:rPr lang="en-US" sz="2000" dirty="0"/>
+              <a:t>Shape map (in preview)</a:t>
+            </a:r>
+          </a:p>
+        </p:txBody>
+      </p:sp>
+      <p:pic>
+        <p:nvPicPr>
+          <p:cNvPr id="4" name="Picture 3"/>
+          <p:cNvPicPr>
+            <a:picLocks noChangeAspect="1"/>
+          </p:cNvPicPr>
+          <p:nvPr/>
+        </p:nvPicPr>
+        <p:blipFill>
+          <a:blip r:embed="rId2"/>
+          <a:stretch>
+            <a:fillRect/>
+          </a:stretch>
+        </p:blipFill>
+        <p:spPr>
+          <a:xfrm>
+            <a:off x="5029200" y="1295400"/>
+            <a:ext cx="3581400" cy="3540235"/>
+          </a:xfrm>
+          <a:prstGeom prst="rect">
+            <a:avLst/>
+          </a:prstGeom>
+          <a:ln w="38100">
+            <a:solidFill>
+              <a:schemeClr val="tx1"/>
+            </a:solidFill>
+          </a:ln>
+        </p:spPr>
+      </p:pic>
+    </p:spTree>
+    <p:extLst>
+      <p:ext uri="{BB962C8B-B14F-4D97-AF65-F5344CB8AC3E}">
+        <p14:creationId xmlns:p14="http://schemas.microsoft.com/office/powerpoint/2010/main" val="2865928254"/>
+      </p:ext>
+    </p:extLst>
+  </p:cSld>
+  <p:clrMapOvr>
+    <a:masterClrMapping/>
+  </p:clrMapOvr>
+</p:sld>
+</file>
+
+<file path=ppt/slides/slide30.xml><?xml version="1.0" encoding="utf-8"?>
+<p:sld xmlns:a="http://schemas.openxmlformats.org/drawingml/2006/main" xmlns:r="http://schemas.openxmlformats.org/officeDocument/2006/relationships" xmlns:p="http://schemas.openxmlformats.org/presentationml/2006/main">
+  <p:cSld>
+    <p:spTree>
+      <p:nvGrpSpPr>
+        <p:cNvPr id="1" name=""/>
+        <p:cNvGrpSpPr/>
+        <p:nvPr/>
+      </p:nvGrpSpPr>
+      <p:grpSpPr>
+        <a:xfrm>
+          <a:off x="0" y="0"/>
+          <a:ext cx="0" cy="0"/>
+          <a:chOff x="0" y="0"/>
+          <a:chExt cx="0" cy="0"/>
+        </a:xfrm>
+      </p:grpSpPr>
+      <p:sp>
+        <p:nvSpPr>
+          <p:cNvPr id="2" name="Title 1"/>
+          <p:cNvSpPr>
+            <a:spLocks noGrp="1"/>
+          </p:cNvSpPr>
+          <p:nvPr>
+            <p:ph type="title"/>
+          </p:nvPr>
+        </p:nvSpPr>
+        <p:spPr/>
+        <p:txBody>
+          <a:bodyPr/>
+          <a:lstStyle/>
+          <a:p>
+            <a:r>
+              <a:rPr lang="en-US" dirty="0"/>
+              <a:t>The </a:t>
+            </a:r>
+            <a:r>
+              <a:rPr lang="en-US" dirty="0" err="1"/>
+              <a:t>tsconfig.json</a:t>
+            </a:r>
+            <a:r>
+              <a:rPr lang="en-US" dirty="0"/>
+              <a:t> File </a:t>
+            </a:r>
+          </a:p>
+        </p:txBody>
+      </p:sp>
+      <p:sp>
+        <p:nvSpPr>
+          <p:cNvPr id="6" name="Content Placeholder 5"/>
+          <p:cNvSpPr>
+            <a:spLocks noGrp="1"/>
+          </p:cNvSpPr>
+          <p:nvPr>
+            <p:ph idx="1"/>
+          </p:nvPr>
+        </p:nvSpPr>
+        <p:spPr/>
+        <p:txBody>
+          <a:bodyPr>
+            <a:normAutofit/>
+          </a:bodyPr>
+          <a:lstStyle/>
+          <a:p>
+            <a:r>
+              <a:rPr lang="en-US" sz="2400" dirty="0"/>
+              <a:t>Used to add references to </a:t>
+            </a:r>
+            <a:r>
+              <a:rPr lang="en-US" sz="2400" dirty="0" err="1"/>
+              <a:t>typings</a:t>
+            </a:r>
+            <a:r>
+              <a:rPr lang="en-US" sz="2400" dirty="0"/>
+              <a:t> files</a:t>
+            </a:r>
+          </a:p>
+          <a:p>
+            <a:pPr lvl="1"/>
+            <a:r>
+              <a:rPr lang="en-US" sz="2000" dirty="0"/>
+              <a:t>This is what enables </a:t>
+            </a:r>
+            <a:r>
+              <a:rPr lang="en-US" sz="2000" dirty="0" err="1"/>
+              <a:t>Intellisense</a:t>
+            </a:r>
+            <a:endParaRPr lang="en-US" sz="2000" dirty="0"/>
+          </a:p>
+        </p:txBody>
+      </p:sp>
+      <p:pic>
+        <p:nvPicPr>
+          <p:cNvPr id="5" name="Picture 4"/>
+          <p:cNvPicPr>
+            <a:picLocks noChangeAspect="1"/>
+          </p:cNvPicPr>
+          <p:nvPr/>
+        </p:nvPicPr>
+        <p:blipFill rotWithShape="1">
+          <a:blip r:embed="rId2"/>
+          <a:srcRect r="32614" b="8136"/>
+          <a:stretch/>
+        </p:blipFill>
+        <p:spPr>
+          <a:xfrm>
+            <a:off x="990600" y="2364861"/>
+            <a:ext cx="4953001" cy="4264539"/>
+          </a:xfrm>
+          <a:prstGeom prst="rect">
+            <a:avLst/>
+          </a:prstGeom>
+        </p:spPr>
+      </p:pic>
+      <p:sp>
+        <p:nvSpPr>
+          <p:cNvPr id="4" name="Left Arrow 3"/>
+          <p:cNvSpPr/>
+          <p:nvPr/>
+        </p:nvSpPr>
+        <p:spPr>
+          <a:xfrm>
+            <a:off x="5301343" y="4297680"/>
+            <a:ext cx="2286000" cy="304800"/>
+          </a:xfrm>
+          <a:prstGeom prst="leftArrow">
+            <a:avLst>
+              <a:gd name="adj1" fmla="val 100000"/>
+              <a:gd name="adj2" fmla="val 50000"/>
+            </a:avLst>
+          </a:prstGeom>
+          <a:solidFill>
+            <a:schemeClr val="accent2"/>
+          </a:solidFill>
+          <a:ln>
+            <a:solidFill>
+              <a:schemeClr val="tx1"/>
+            </a:solidFill>
+          </a:ln>
+        </p:spPr>
+        <p:style>
+          <a:lnRef idx="2">
+            <a:schemeClr val="accent1">
+              <a:shade val="50000"/>
+            </a:schemeClr>
+          </a:lnRef>
+          <a:fillRef idx="1">
+            <a:schemeClr val="accent1"/>
+          </a:fillRef>
+          <a:effectRef idx="0">
+            <a:schemeClr val="accent1"/>
+          </a:effectRef>
+          <a:fontRef idx="minor">
+            <a:schemeClr val="lt1"/>
+          </a:fontRef>
+        </p:style>
+        <p:txBody>
+          <a:bodyPr rtlCol="0" anchor="ctr"/>
+          <a:lstStyle/>
+          <a:p>
+            <a:pPr algn="ctr"/>
+            <a:r>
+              <a:rPr lang="en-US" sz="1400" dirty="0">
+                <a:solidFill>
+                  <a:schemeClr val="accent1">
+                    <a:lumMod val="50000"/>
+                  </a:schemeClr>
+                </a:solidFill>
+              </a:rPr>
+              <a:t>Typings file reference</a:t>
+            </a:r>
+          </a:p>
+        </p:txBody>
+      </p:sp>
+    </p:spTree>
+    <p:extLst>
+      <p:ext uri="{BB962C8B-B14F-4D97-AF65-F5344CB8AC3E}">
+        <p14:creationId xmlns:p14="http://schemas.microsoft.com/office/powerpoint/2010/main" val="1288110123"/>
+      </p:ext>
+    </p:extLst>
+  </p:cSld>
+  <p:clrMapOvr>
+    <a:masterClrMapping/>
+  </p:clrMapOvr>
+</p:sld>
+</file>
+
+<file path=ppt/slides/slide31.xml><?xml version="1.0" encoding="utf-8"?>
+<p:sld xmlns:a="http://schemas.openxmlformats.org/drawingml/2006/main" xmlns:r="http://schemas.openxmlformats.org/officeDocument/2006/relationships" xmlns:p="http://schemas.openxmlformats.org/presentationml/2006/main">
+  <p:cSld>
+    <p:spTree>
+      <p:nvGrpSpPr>
+        <p:cNvPr id="1" name=""/>
+        <p:cNvGrpSpPr/>
+        <p:nvPr/>
+      </p:nvGrpSpPr>
+      <p:grpSpPr>
+        <a:xfrm>
+          <a:off x="0" y="0"/>
+          <a:ext cx="0" cy="0"/>
+          <a:chOff x="0" y="0"/>
+          <a:chExt cx="0" cy="0"/>
+        </a:xfrm>
+      </p:grpSpPr>
+      <p:sp>
+        <p:nvSpPr>
+          <p:cNvPr id="2" name="Title 1"/>
+          <p:cNvSpPr>
+            <a:spLocks noGrp="1"/>
+          </p:cNvSpPr>
+          <p:nvPr>
+            <p:ph type="title"/>
+          </p:nvPr>
+        </p:nvSpPr>
+        <p:spPr/>
+        <p:txBody>
+          <a:bodyPr/>
+          <a:lstStyle/>
+          <a:p>
+            <a:r>
+              <a:rPr lang="en-US" dirty="0"/>
+              <a:t>Developing a Custom Visual?</a:t>
+            </a:r>
+          </a:p>
+        </p:txBody>
+      </p:sp>
+      <p:sp>
+        <p:nvSpPr>
+          <p:cNvPr id="3" name="Content Placeholder 2"/>
+          <p:cNvSpPr>
+            <a:spLocks noGrp="1"/>
+          </p:cNvSpPr>
+          <p:nvPr>
+            <p:ph idx="1"/>
+          </p:nvPr>
+        </p:nvSpPr>
+        <p:spPr/>
+        <p:txBody>
+          <a:bodyPr/>
+          <a:lstStyle/>
+          <a:p>
+            <a:r>
+              <a:rPr lang="en-US" dirty="0"/>
+              <a:t>Create a class that implements </a:t>
+            </a:r>
+            <a:r>
+              <a:rPr lang="en-US" dirty="0" err="1"/>
+              <a:t>IVisual</a:t>
+            </a:r>
+            <a:endParaRPr lang="en-US" dirty="0"/>
+          </a:p>
+          <a:p>
+            <a:pPr lvl="1"/>
+            <a:r>
+              <a:rPr lang="en-US" dirty="0"/>
+              <a:t>Class wrapped in module with namespace to APIs</a:t>
+            </a:r>
+          </a:p>
+          <a:p>
+            <a:pPr lvl="1"/>
+            <a:r>
+              <a:rPr lang="en-US" dirty="0"/>
+              <a:t>You code can program again PBI APIs types</a:t>
+            </a:r>
+          </a:p>
+          <a:p>
+            <a:endParaRPr lang="en-US" dirty="0"/>
+          </a:p>
+        </p:txBody>
+      </p:sp>
+      <p:pic>
+        <p:nvPicPr>
+          <p:cNvPr id="6" name="Picture 5"/>
+          <p:cNvPicPr>
+            <a:picLocks noChangeAspect="1"/>
+          </p:cNvPicPr>
+          <p:nvPr/>
+        </p:nvPicPr>
+        <p:blipFill>
+          <a:blip r:embed="rId2"/>
+          <a:stretch>
+            <a:fillRect/>
+          </a:stretch>
+        </p:blipFill>
+        <p:spPr>
+          <a:xfrm>
+            <a:off x="1295400" y="3200400"/>
+            <a:ext cx="3707674" cy="2724516"/>
+          </a:xfrm>
+          <a:prstGeom prst="rect">
+            <a:avLst/>
+          </a:prstGeom>
+        </p:spPr>
+      </p:pic>
+    </p:spTree>
+    <p:extLst>
+      <p:ext uri="{BB962C8B-B14F-4D97-AF65-F5344CB8AC3E}">
+        <p14:creationId xmlns:p14="http://schemas.microsoft.com/office/powerpoint/2010/main" val="3644345533"/>
+      </p:ext>
+    </p:extLst>
+  </p:cSld>
+  <p:clrMapOvr>
+    <a:masterClrMapping/>
+  </p:clrMapOvr>
+</p:sld>
+</file>
+
+<file path=ppt/slides/slide32.xml><?xml version="1.0" encoding="utf-8"?>
+<p:sld xmlns:a="http://schemas.openxmlformats.org/drawingml/2006/main" xmlns:r="http://schemas.openxmlformats.org/officeDocument/2006/relationships" xmlns:p="http://schemas.openxmlformats.org/presentationml/2006/main">
+  <p:cSld>
+    <p:spTree>
+      <p:nvGrpSpPr>
+        <p:cNvPr id="1" name=""/>
+        <p:cNvGrpSpPr/>
+        <p:nvPr/>
+      </p:nvGrpSpPr>
+      <p:grpSpPr>
+        <a:xfrm>
+          <a:off x="0" y="0"/>
+          <a:ext cx="0" cy="0"/>
+          <a:chOff x="0" y="0"/>
+          <a:chExt cx="0" cy="0"/>
+        </a:xfrm>
+      </p:grpSpPr>
+      <p:sp>
+        <p:nvSpPr>
           <p:cNvPr id="48130" name="Title 1"/>
           <p:cNvSpPr>
             <a:spLocks noGrp="1"/>
@@ -5061,7 +6632,7 @@
 </p:sld>
 </file>
 
-<file path=ppt/slides/slide26.xml><?xml version="1.0" encoding="utf-8"?>
+<file path=ppt/slides/slide33.xml><?xml version="1.0" encoding="utf-8"?>
 <p:sld xmlns:a="http://schemas.openxmlformats.org/drawingml/2006/main" xmlns:r="http://schemas.openxmlformats.org/officeDocument/2006/relationships" xmlns:p="http://schemas.openxmlformats.org/presentationml/2006/main">
   <p:cSld>
     <p:spTree>
@@ -5167,839 +6738,7 @@
 </p:sld>
 </file>
 
-<file path=ppt/slides/slide27.xml><?xml version="1.0" encoding="utf-8"?>
-<p:sld xmlns:a="http://schemas.openxmlformats.org/drawingml/2006/main" xmlns:r="http://schemas.openxmlformats.org/officeDocument/2006/relationships" xmlns:p="http://schemas.openxmlformats.org/presentationml/2006/main">
-  <p:cSld>
-    <p:spTree>
-      <p:nvGrpSpPr>
-        <p:cNvPr id="1" name=""/>
-        <p:cNvGrpSpPr/>
-        <p:nvPr/>
-      </p:nvGrpSpPr>
-      <p:grpSpPr>
-        <a:xfrm>
-          <a:off x="0" y="0"/>
-          <a:ext cx="0" cy="0"/>
-          <a:chOff x="0" y="0"/>
-          <a:chExt cx="0" cy="0"/>
-        </a:xfrm>
-      </p:grpSpPr>
-      <p:sp>
-        <p:nvSpPr>
-          <p:cNvPr id="2" name="Title 1"/>
-          <p:cNvSpPr>
-            <a:spLocks noGrp="1"/>
-          </p:cNvSpPr>
-          <p:nvPr>
-            <p:ph type="title"/>
-          </p:nvPr>
-        </p:nvSpPr>
-        <p:spPr/>
-        <p:txBody>
-          <a:bodyPr/>
-          <a:lstStyle/>
-          <a:p>
-            <a:r>
-              <a:rPr lang="en-US" dirty="0"/>
-              <a:t>What is a Custom Visual?</a:t>
-            </a:r>
-          </a:p>
-        </p:txBody>
-      </p:sp>
-      <p:sp>
-        <p:nvSpPr>
-          <p:cNvPr id="3" name="Content Placeholder 2"/>
-          <p:cNvSpPr>
-            <a:spLocks noGrp="1"/>
-          </p:cNvSpPr>
-          <p:nvPr>
-            <p:ph idx="1"/>
-          </p:nvPr>
-        </p:nvSpPr>
-        <p:spPr/>
-        <p:txBody>
-          <a:bodyPr/>
-          <a:lstStyle/>
-          <a:p>
-            <a:r>
-              <a:rPr lang="en-US" dirty="0"/>
-              <a:t>Defined inside </a:t>
-            </a:r>
-            <a:r>
-              <a:rPr lang="en-US" dirty="0" err="1"/>
-              <a:t>pbiviz.json</a:t>
-            </a:r>
-            <a:r>
-              <a:rPr lang="en-US" dirty="0"/>
-              <a:t> file</a:t>
-            </a:r>
-          </a:p>
-          <a:p>
-            <a:r>
-              <a:rPr lang="en-US" dirty="0"/>
-              <a:t>class that implements </a:t>
-            </a:r>
-            <a:r>
-              <a:rPr lang="en-US" dirty="0" err="1"/>
-              <a:t>IVisual</a:t>
-            </a:r>
-            <a:endParaRPr lang="en-US" dirty="0"/>
-          </a:p>
-          <a:p>
-            <a:r>
-              <a:rPr lang="en-US" dirty="0"/>
-              <a:t>wrapped in module with namespace to APIs interfaces</a:t>
-            </a:r>
-          </a:p>
-          <a:p>
-            <a:endParaRPr lang="en-US" dirty="0"/>
-          </a:p>
-        </p:txBody>
-      </p:sp>
-      <p:pic>
-        <p:nvPicPr>
-          <p:cNvPr id="6" name="Picture 5"/>
-          <p:cNvPicPr>
-            <a:picLocks noChangeAspect="1"/>
-          </p:cNvPicPr>
-          <p:nvPr/>
-        </p:nvPicPr>
-        <p:blipFill>
-          <a:blip r:embed="rId2"/>
-          <a:stretch>
-            <a:fillRect/>
-          </a:stretch>
-        </p:blipFill>
-        <p:spPr>
-          <a:xfrm>
-            <a:off x="4465320" y="3048000"/>
-            <a:ext cx="3707674" cy="2724516"/>
-          </a:xfrm>
-          <a:prstGeom prst="rect">
-            <a:avLst/>
-          </a:prstGeom>
-        </p:spPr>
-      </p:pic>
-      <p:pic>
-        <p:nvPicPr>
-          <p:cNvPr id="7" name="Picture 6"/>
-          <p:cNvPicPr>
-            <a:picLocks noChangeAspect="1"/>
-          </p:cNvPicPr>
-          <p:nvPr/>
-        </p:nvPicPr>
-        <p:blipFill>
-          <a:blip r:embed="rId3"/>
-          <a:stretch>
-            <a:fillRect/>
-          </a:stretch>
-        </p:blipFill>
-        <p:spPr>
-          <a:xfrm>
-            <a:off x="217714" y="3048000"/>
-            <a:ext cx="3657600" cy="3387948"/>
-          </a:xfrm>
-          <a:prstGeom prst="rect">
-            <a:avLst/>
-          </a:prstGeom>
-        </p:spPr>
-      </p:pic>
-    </p:spTree>
-    <p:extLst>
-      <p:ext uri="{BB962C8B-B14F-4D97-AF65-F5344CB8AC3E}">
-        <p14:creationId xmlns:p14="http://schemas.microsoft.com/office/powerpoint/2010/main" val="3644345533"/>
-      </p:ext>
-    </p:extLst>
-  </p:cSld>
-  <p:clrMapOvr>
-    <a:masterClrMapping/>
-  </p:clrMapOvr>
-</p:sld>
-</file>
-
-<file path=ppt/slides/slide28.xml><?xml version="1.0" encoding="utf-8"?>
-<p:sld xmlns:a="http://schemas.openxmlformats.org/drawingml/2006/main" xmlns:r="http://schemas.openxmlformats.org/officeDocument/2006/relationships" xmlns:p="http://schemas.openxmlformats.org/presentationml/2006/main">
-  <p:cSld>
-    <p:spTree>
-      <p:nvGrpSpPr>
-        <p:cNvPr id="1" name=""/>
-        <p:cNvGrpSpPr/>
-        <p:nvPr/>
-      </p:nvGrpSpPr>
-      <p:grpSpPr>
-        <a:xfrm>
-          <a:off x="0" y="0"/>
-          <a:ext cx="0" cy="0"/>
-          <a:chOff x="0" y="0"/>
-          <a:chExt cx="0" cy="0"/>
-        </a:xfrm>
-      </p:grpSpPr>
-      <p:sp>
-        <p:nvSpPr>
-          <p:cNvPr id="2" name="Title 1"/>
-          <p:cNvSpPr>
-            <a:spLocks noGrp="1"/>
-          </p:cNvSpPr>
-          <p:nvPr>
-            <p:ph type="title"/>
-          </p:nvPr>
-        </p:nvSpPr>
-        <p:spPr/>
-        <p:txBody>
-          <a:bodyPr/>
-          <a:lstStyle/>
-          <a:p>
-            <a:r>
-              <a:rPr lang="en-US" dirty="0"/>
-              <a:t>Install Typings for D3</a:t>
-            </a:r>
-          </a:p>
-        </p:txBody>
-      </p:sp>
-      <p:sp>
-        <p:nvSpPr>
-          <p:cNvPr id="3" name="Content Placeholder 2"/>
-          <p:cNvSpPr>
-            <a:spLocks noGrp="1"/>
-          </p:cNvSpPr>
-          <p:nvPr>
-            <p:ph idx="1"/>
-          </p:nvPr>
-        </p:nvSpPr>
-        <p:spPr/>
-        <p:txBody>
-          <a:bodyPr/>
-          <a:lstStyle/>
-          <a:p>
-            <a:r>
-              <a:rPr lang="en-US" dirty="0"/>
-              <a:t>Install global Typings support</a:t>
-            </a:r>
-          </a:p>
-          <a:p>
-            <a:pPr lvl="1"/>
-            <a:r>
-              <a:rPr lang="en-US" dirty="0" err="1"/>
-              <a:t>npm</a:t>
-            </a:r>
-            <a:r>
-              <a:rPr lang="en-US" dirty="0"/>
-              <a:t> install </a:t>
-            </a:r>
-            <a:r>
-              <a:rPr lang="en-US" dirty="0" err="1"/>
-              <a:t>typings</a:t>
-            </a:r>
-            <a:r>
-              <a:rPr lang="en-US" dirty="0"/>
-              <a:t> –g</a:t>
-            </a:r>
-          </a:p>
-          <a:p>
-            <a:pPr lvl="1"/>
-            <a:endParaRPr lang="en-US" dirty="0"/>
-          </a:p>
-          <a:p>
-            <a:r>
-              <a:rPr lang="en-US" dirty="0"/>
-              <a:t>Install d3 for specific project</a:t>
-            </a:r>
-          </a:p>
-        </p:txBody>
-      </p:sp>
-    </p:spTree>
-    <p:extLst>
-      <p:ext uri="{BB962C8B-B14F-4D97-AF65-F5344CB8AC3E}">
-        <p14:creationId xmlns:p14="http://schemas.microsoft.com/office/powerpoint/2010/main" val="2493262635"/>
-      </p:ext>
-    </p:extLst>
-  </p:cSld>
-  <p:clrMapOvr>
-    <a:masterClrMapping/>
-  </p:clrMapOvr>
-</p:sld>
-</file>
-
-<file path=ppt/slides/slide29.xml><?xml version="1.0" encoding="utf-8"?>
-<p:sld xmlns:a="http://schemas.openxmlformats.org/drawingml/2006/main" xmlns:r="http://schemas.openxmlformats.org/officeDocument/2006/relationships" xmlns:p="http://schemas.openxmlformats.org/presentationml/2006/main">
-  <p:cSld>
-    <p:spTree>
-      <p:nvGrpSpPr>
-        <p:cNvPr id="1" name=""/>
-        <p:cNvGrpSpPr/>
-        <p:nvPr/>
-      </p:nvGrpSpPr>
-      <p:grpSpPr>
-        <a:xfrm>
-          <a:off x="0" y="0"/>
-          <a:ext cx="0" cy="0"/>
-          <a:chOff x="0" y="0"/>
-          <a:chExt cx="0" cy="0"/>
-        </a:xfrm>
-      </p:grpSpPr>
-      <p:sp>
-        <p:nvSpPr>
-          <p:cNvPr id="2" name="Title 1"/>
-          <p:cNvSpPr>
-            <a:spLocks noGrp="1"/>
-          </p:cNvSpPr>
-          <p:nvPr>
-            <p:ph type="title"/>
-          </p:nvPr>
-        </p:nvSpPr>
-        <p:spPr/>
-        <p:txBody>
-          <a:bodyPr/>
-          <a:lstStyle/>
-          <a:p>
-            <a:r>
-              <a:rPr lang="en-US" dirty="0"/>
-              <a:t>Files in the new project</a:t>
-            </a:r>
-          </a:p>
-        </p:txBody>
-      </p:sp>
-      <p:sp>
-        <p:nvSpPr>
-          <p:cNvPr id="3" name="Content Placeholder 2"/>
-          <p:cNvSpPr>
-            <a:spLocks noGrp="1"/>
-          </p:cNvSpPr>
-          <p:nvPr>
-            <p:ph idx="1"/>
-          </p:nvPr>
-        </p:nvSpPr>
-        <p:spPr/>
-        <p:txBody>
-          <a:bodyPr>
-            <a:normAutofit fontScale="92500" lnSpcReduction="10000"/>
-          </a:bodyPr>
-          <a:lstStyle/>
-          <a:p>
-            <a:r>
-              <a:rPr lang="en-US" dirty="0" err="1"/>
-              <a:t>gitignore</a:t>
-            </a:r>
-            <a:endParaRPr lang="en-US" dirty="0"/>
-          </a:p>
-          <a:p>
-            <a:pPr lvl="1"/>
-            <a:r>
-              <a:rPr lang="en-US" dirty="0"/>
-              <a:t>tells </a:t>
-            </a:r>
-            <a:r>
-              <a:rPr lang="en-US" dirty="0" err="1"/>
-              <a:t>git</a:t>
-            </a:r>
-            <a:r>
-              <a:rPr lang="en-US" dirty="0"/>
-              <a:t> to ignore files that shouldn't be tracked in the repository</a:t>
-            </a:r>
-          </a:p>
-          <a:p>
-            <a:r>
-              <a:rPr lang="en-US" dirty="0" err="1"/>
-              <a:t>capabilities.json</a:t>
-            </a:r>
-            <a:endParaRPr lang="en-US" dirty="0"/>
-          </a:p>
-          <a:p>
-            <a:pPr lvl="1"/>
-            <a:r>
-              <a:rPr lang="en-US" dirty="0"/>
-              <a:t>used to define the capabilities of your visual learn more about visual capabilities</a:t>
-            </a:r>
-          </a:p>
-          <a:p>
-            <a:r>
-              <a:rPr lang="en-US" dirty="0" err="1"/>
-              <a:t>package.json</a:t>
-            </a:r>
-            <a:endParaRPr lang="en-US" dirty="0"/>
-          </a:p>
-          <a:p>
-            <a:pPr lvl="1"/>
-            <a:r>
-              <a:rPr lang="en-US" dirty="0"/>
-              <a:t>Used by </a:t>
-            </a:r>
-            <a:r>
-              <a:rPr lang="en-US" dirty="0" err="1"/>
-              <a:t>npm</a:t>
-            </a:r>
-            <a:r>
-              <a:rPr lang="en-US" dirty="0"/>
-              <a:t> to manage modules learn more about </a:t>
-            </a:r>
-            <a:r>
-              <a:rPr lang="en-US" dirty="0" err="1"/>
-              <a:t>npm</a:t>
-            </a:r>
-            <a:endParaRPr lang="en-US" dirty="0"/>
-          </a:p>
-          <a:p>
-            <a:r>
-              <a:rPr lang="en-US" dirty="0" err="1"/>
-              <a:t>pbiviz.json</a:t>
-            </a:r>
-            <a:endParaRPr lang="en-US" dirty="0"/>
-          </a:p>
-          <a:p>
-            <a:pPr lvl="1"/>
-            <a:r>
-              <a:rPr lang="en-US" dirty="0"/>
-              <a:t>Main configuration file for your visual</a:t>
-            </a:r>
-          </a:p>
-          <a:p>
-            <a:r>
-              <a:rPr lang="en-US" dirty="0" err="1"/>
-              <a:t>tsconfig.json</a:t>
-            </a:r>
-            <a:endParaRPr lang="en-US" dirty="0"/>
-          </a:p>
-          <a:p>
-            <a:pPr lvl="1"/>
-            <a:r>
-              <a:rPr lang="en-US" dirty="0"/>
-              <a:t>Typescript compiler settings learn more about </a:t>
-            </a:r>
-            <a:r>
-              <a:rPr lang="en-US" dirty="0" err="1"/>
-              <a:t>tsconfig</a:t>
-            </a:r>
-            <a:endParaRPr lang="en-US" dirty="0"/>
-          </a:p>
-        </p:txBody>
-      </p:sp>
-    </p:spTree>
-    <p:extLst>
-      <p:ext uri="{BB962C8B-B14F-4D97-AF65-F5344CB8AC3E}">
-        <p14:creationId xmlns:p14="http://schemas.microsoft.com/office/powerpoint/2010/main" val="3834822213"/>
-      </p:ext>
-    </p:extLst>
-  </p:cSld>
-  <p:clrMapOvr>
-    <a:masterClrMapping/>
-  </p:clrMapOvr>
-</p:sld>
-</file>
-
-<file path=ppt/slides/slide3.xml><?xml version="1.0" encoding="utf-8"?>
-<p:sld xmlns:a="http://schemas.openxmlformats.org/drawingml/2006/main" xmlns:r="http://schemas.openxmlformats.org/officeDocument/2006/relationships" xmlns:p="http://schemas.openxmlformats.org/presentationml/2006/main">
-  <p:cSld>
-    <p:spTree>
-      <p:nvGrpSpPr>
-        <p:cNvPr id="1" name=""/>
-        <p:cNvGrpSpPr/>
-        <p:nvPr/>
-      </p:nvGrpSpPr>
-      <p:grpSpPr>
-        <a:xfrm>
-          <a:off x="0" y="0"/>
-          <a:ext cx="0" cy="0"/>
-          <a:chOff x="0" y="0"/>
-          <a:chExt cx="0" cy="0"/>
-        </a:xfrm>
-      </p:grpSpPr>
-      <p:sp>
-        <p:nvSpPr>
-          <p:cNvPr id="2" name="Title 1"/>
-          <p:cNvSpPr>
-            <a:spLocks noGrp="1"/>
-          </p:cNvSpPr>
-          <p:nvPr>
-            <p:ph type="title"/>
-          </p:nvPr>
-        </p:nvSpPr>
-        <p:spPr/>
-        <p:txBody>
-          <a:bodyPr/>
-          <a:lstStyle/>
-          <a:p>
-            <a:r>
-              <a:rPr lang="en-US" dirty="0"/>
-              <a:t>Built-in Visualization Types</a:t>
-            </a:r>
-          </a:p>
-        </p:txBody>
-      </p:sp>
-      <p:sp>
-        <p:nvSpPr>
-          <p:cNvPr id="3" name="Content Placeholder 2"/>
-          <p:cNvSpPr>
-            <a:spLocks noGrp="1"/>
-          </p:cNvSpPr>
-          <p:nvPr>
-            <p:ph idx="1"/>
-          </p:nvPr>
-        </p:nvSpPr>
-        <p:spPr>
-          <a:xfrm>
-            <a:off x="533400" y="1295400"/>
-            <a:ext cx="4114800" cy="5257801"/>
-          </a:xfrm>
-        </p:spPr>
-        <p:txBody>
-          <a:bodyPr>
-            <a:noAutofit/>
-          </a:bodyPr>
-          <a:lstStyle/>
-          <a:p>
-            <a:pPr marL="182880">
-              <a:spcBef>
-                <a:spcPts val="200"/>
-              </a:spcBef>
-            </a:pPr>
-            <a:r>
-              <a:rPr lang="en-US" sz="2000" dirty="0"/>
-              <a:t>Table and Matrix</a:t>
-            </a:r>
-          </a:p>
-          <a:p>
-            <a:pPr marL="182880">
-              <a:spcBef>
-                <a:spcPts val="200"/>
-              </a:spcBef>
-            </a:pPr>
-            <a:r>
-              <a:rPr lang="en-US" sz="2000" dirty="0"/>
-              <a:t>Bar charts and Column charts</a:t>
-            </a:r>
-          </a:p>
-          <a:p>
-            <a:pPr marL="182880">
-              <a:spcBef>
-                <a:spcPts val="200"/>
-              </a:spcBef>
-            </a:pPr>
-            <a:r>
-              <a:rPr lang="en-US" sz="2000" dirty="0"/>
-              <a:t>Pie charts and Doughnut chart</a:t>
-            </a:r>
-          </a:p>
-          <a:p>
-            <a:pPr marL="182880">
-              <a:spcBef>
-                <a:spcPts val="200"/>
-              </a:spcBef>
-            </a:pPr>
-            <a:r>
-              <a:rPr lang="en-US" sz="2000" dirty="0"/>
-              <a:t>Line chart and Area chart</a:t>
-            </a:r>
-          </a:p>
-          <a:p>
-            <a:pPr marL="182880">
-              <a:spcBef>
-                <a:spcPts val="200"/>
-              </a:spcBef>
-            </a:pPr>
-            <a:r>
-              <a:rPr lang="en-US" sz="2000" dirty="0"/>
-              <a:t>Scatter chart and Combo charts</a:t>
-            </a:r>
-          </a:p>
-          <a:p>
-            <a:pPr marL="182880">
-              <a:spcBef>
-                <a:spcPts val="200"/>
-              </a:spcBef>
-            </a:pPr>
-            <a:r>
-              <a:rPr lang="en-US" sz="2000" dirty="0"/>
-              <a:t>Card and Multi-row Card</a:t>
-            </a:r>
-          </a:p>
-          <a:p>
-            <a:pPr marL="182880">
-              <a:spcBef>
-                <a:spcPts val="200"/>
-              </a:spcBef>
-            </a:pPr>
-            <a:r>
-              <a:rPr lang="en-US" sz="2000" dirty="0" err="1"/>
-              <a:t>Treemap</a:t>
-            </a:r>
-            <a:endParaRPr lang="en-US" sz="2000" dirty="0"/>
-          </a:p>
-          <a:p>
-            <a:pPr marL="182880">
-              <a:spcBef>
-                <a:spcPts val="200"/>
-              </a:spcBef>
-            </a:pPr>
-            <a:r>
-              <a:rPr lang="en-US" sz="2000" dirty="0"/>
-              <a:t>Waterfall charts</a:t>
-            </a:r>
-          </a:p>
-          <a:p>
-            <a:pPr marL="182880">
-              <a:spcBef>
-                <a:spcPts val="200"/>
-              </a:spcBef>
-            </a:pPr>
-            <a:r>
-              <a:rPr lang="en-US" sz="2000" dirty="0"/>
-              <a:t>Funnel charts</a:t>
-            </a:r>
-          </a:p>
-          <a:p>
-            <a:pPr marL="182880">
-              <a:spcBef>
-                <a:spcPts val="200"/>
-              </a:spcBef>
-            </a:pPr>
-            <a:r>
-              <a:rPr lang="en-US" sz="2000" dirty="0"/>
-              <a:t>Gauge charts</a:t>
-            </a:r>
-          </a:p>
-          <a:p>
-            <a:pPr marL="182880">
-              <a:spcBef>
-                <a:spcPts val="200"/>
-              </a:spcBef>
-            </a:pPr>
-            <a:r>
-              <a:rPr lang="en-US" sz="2000" dirty="0"/>
-              <a:t>Map and Filled Map</a:t>
-            </a:r>
-          </a:p>
-          <a:p>
-            <a:pPr marL="182880">
-              <a:spcBef>
-                <a:spcPts val="200"/>
-              </a:spcBef>
-            </a:pPr>
-            <a:r>
-              <a:rPr lang="en-US" sz="2000" dirty="0"/>
-              <a:t>Slicer</a:t>
-            </a:r>
-          </a:p>
-          <a:p>
-            <a:pPr marL="182880">
-              <a:spcBef>
-                <a:spcPts val="200"/>
-              </a:spcBef>
-            </a:pPr>
-            <a:r>
-              <a:rPr lang="en-US" sz="2000" dirty="0"/>
-              <a:t>R script visual</a:t>
-            </a:r>
-          </a:p>
-          <a:p>
-            <a:pPr marL="182880">
-              <a:spcBef>
-                <a:spcPts val="200"/>
-              </a:spcBef>
-            </a:pPr>
-            <a:r>
-              <a:rPr lang="en-US" sz="2000" dirty="0"/>
-              <a:t>Shape map (in preview)</a:t>
-            </a:r>
-          </a:p>
-        </p:txBody>
-      </p:sp>
-      <p:pic>
-        <p:nvPicPr>
-          <p:cNvPr id="4" name="Picture 3"/>
-          <p:cNvPicPr>
-            <a:picLocks noChangeAspect="1"/>
-          </p:cNvPicPr>
-          <p:nvPr/>
-        </p:nvPicPr>
-        <p:blipFill>
-          <a:blip r:embed="rId2"/>
-          <a:stretch>
-            <a:fillRect/>
-          </a:stretch>
-        </p:blipFill>
-        <p:spPr>
-          <a:xfrm>
-            <a:off x="5029200" y="1295400"/>
-            <a:ext cx="3581400" cy="3540235"/>
-          </a:xfrm>
-          <a:prstGeom prst="rect">
-            <a:avLst/>
-          </a:prstGeom>
-          <a:ln w="38100">
-            <a:solidFill>
-              <a:schemeClr val="tx1"/>
-            </a:solidFill>
-          </a:ln>
-        </p:spPr>
-      </p:pic>
-    </p:spTree>
-    <p:extLst>
-      <p:ext uri="{BB962C8B-B14F-4D97-AF65-F5344CB8AC3E}">
-        <p14:creationId xmlns:p14="http://schemas.microsoft.com/office/powerpoint/2010/main" val="2865928254"/>
-      </p:ext>
-    </p:extLst>
-  </p:cSld>
-  <p:clrMapOvr>
-    <a:masterClrMapping/>
-  </p:clrMapOvr>
-</p:sld>
-</file>
-
-<file path=ppt/slides/slide30.xml><?xml version="1.0" encoding="utf-8"?>
-<p:sld xmlns:a="http://schemas.openxmlformats.org/drawingml/2006/main" xmlns:r="http://schemas.openxmlformats.org/officeDocument/2006/relationships" xmlns:p="http://schemas.openxmlformats.org/presentationml/2006/main">
-  <p:cSld>
-    <p:spTree>
-      <p:nvGrpSpPr>
-        <p:cNvPr id="1" name=""/>
-        <p:cNvGrpSpPr/>
-        <p:nvPr/>
-      </p:nvGrpSpPr>
-      <p:grpSpPr>
-        <a:xfrm>
-          <a:off x="0" y="0"/>
-          <a:ext cx="0" cy="0"/>
-          <a:chOff x="0" y="0"/>
-          <a:chExt cx="0" cy="0"/>
-        </a:xfrm>
-      </p:grpSpPr>
-      <p:sp>
-        <p:nvSpPr>
-          <p:cNvPr id="2" name="Title 1"/>
-          <p:cNvSpPr>
-            <a:spLocks noGrp="1"/>
-          </p:cNvSpPr>
-          <p:nvPr>
-            <p:ph type="title"/>
-          </p:nvPr>
-        </p:nvSpPr>
-        <p:spPr/>
-        <p:txBody>
-          <a:bodyPr/>
-          <a:lstStyle/>
-          <a:p>
-            <a:r>
-              <a:rPr lang="en-US" dirty="0"/>
-              <a:t>Folders in the new project</a:t>
-            </a:r>
-          </a:p>
-        </p:txBody>
-      </p:sp>
-      <p:sp>
-        <p:nvSpPr>
-          <p:cNvPr id="3" name="Content Placeholder 2"/>
-          <p:cNvSpPr>
-            <a:spLocks noGrp="1"/>
-          </p:cNvSpPr>
-          <p:nvPr>
-            <p:ph idx="1"/>
-          </p:nvPr>
-        </p:nvSpPr>
-        <p:spPr/>
-        <p:txBody>
-          <a:bodyPr>
-            <a:normAutofit/>
-          </a:bodyPr>
-          <a:lstStyle/>
-          <a:p>
-            <a:r>
-              <a:rPr lang="en-US" dirty="0"/>
-              <a:t>assets/</a:t>
-            </a:r>
-          </a:p>
-          <a:p>
-            <a:pPr lvl="1"/>
-            <a:r>
-              <a:rPr lang="en-US" dirty="0"/>
-              <a:t>Used to store visual assets (icon, screenshots, </a:t>
-            </a:r>
-            <a:r>
-              <a:rPr lang="en-US" dirty="0" err="1"/>
-              <a:t>etc</a:t>
-            </a:r>
-            <a:r>
-              <a:rPr lang="en-US" dirty="0"/>
-              <a:t>)</a:t>
-            </a:r>
-          </a:p>
-          <a:p>
-            <a:r>
-              <a:rPr lang="en-US" dirty="0" err="1"/>
-              <a:t>dist</a:t>
-            </a:r>
-            <a:r>
-              <a:rPr lang="en-US" dirty="0"/>
-              <a:t>/</a:t>
-            </a:r>
-          </a:p>
-          <a:p>
-            <a:pPr lvl="1"/>
-            <a:r>
-              <a:rPr lang="en-US" dirty="0"/>
-              <a:t>when you run </a:t>
-            </a:r>
-            <a:r>
-              <a:rPr lang="en-US" dirty="0" err="1"/>
-              <a:t>pbiviz</a:t>
-            </a:r>
-            <a:r>
-              <a:rPr lang="en-US" dirty="0"/>
-              <a:t> package the </a:t>
-            </a:r>
-            <a:r>
-              <a:rPr lang="en-US" dirty="0" err="1"/>
-              <a:t>pbiviz</a:t>
-            </a:r>
-            <a:r>
-              <a:rPr lang="en-US" dirty="0"/>
-              <a:t> file will be generated here</a:t>
-            </a:r>
-          </a:p>
-          <a:p>
-            <a:r>
-              <a:rPr lang="en-US" dirty="0" err="1"/>
-              <a:t>src</a:t>
-            </a:r>
-            <a:r>
-              <a:rPr lang="en-US" dirty="0"/>
-              <a:t>/</a:t>
-            </a:r>
-          </a:p>
-          <a:p>
-            <a:pPr lvl="1"/>
-            <a:r>
-              <a:rPr lang="en-US" dirty="0"/>
-              <a:t>Typescript code for your visual goes here</a:t>
-            </a:r>
-          </a:p>
-          <a:p>
-            <a:r>
-              <a:rPr lang="en-US" dirty="0"/>
-              <a:t>style/</a:t>
-            </a:r>
-          </a:p>
-          <a:p>
-            <a:pPr lvl="1"/>
-            <a:r>
-              <a:rPr lang="en-US" dirty="0"/>
-              <a:t>Less styles for your visual go here</a:t>
-            </a:r>
-          </a:p>
-        </p:txBody>
-      </p:sp>
-    </p:spTree>
-    <p:extLst>
-      <p:ext uri="{BB962C8B-B14F-4D97-AF65-F5344CB8AC3E}">
-        <p14:creationId xmlns:p14="http://schemas.microsoft.com/office/powerpoint/2010/main" val="2804769379"/>
-      </p:ext>
-    </p:extLst>
-  </p:cSld>
-  <p:clrMapOvr>
-    <a:masterClrMapping/>
-  </p:clrMapOvr>
-</p:sld>
-</file>
-
-<file path=ppt/slides/slide31.xml><?xml version="1.0" encoding="utf-8"?>
+<file path=ppt/slides/slide34.xml><?xml version="1.0" encoding="utf-8"?>
 <p:sld xmlns:a="http://schemas.openxmlformats.org/drawingml/2006/main" xmlns:r="http://schemas.openxmlformats.org/officeDocument/2006/relationships" xmlns:p="http://schemas.openxmlformats.org/presentationml/2006/main">
   <p:cSld>
     <p:spTree>
@@ -6295,7 +7034,7 @@
 </p:sld>
 </file>
 
-<file path=ppt/slides/slide32.xml><?xml version="1.0" encoding="utf-8"?>
+<file path=ppt/slides/slide35.xml><?xml version="1.0" encoding="utf-8"?>
 <p:sld xmlns:a="http://schemas.openxmlformats.org/drawingml/2006/main" xmlns:r="http://schemas.openxmlformats.org/officeDocument/2006/relationships" xmlns:p="http://schemas.openxmlformats.org/presentationml/2006/main">
   <p:cSld>
     <p:spTree>
@@ -8258,21 +8997,6 @@
 </file>
 
 <file path=customXml/item2.xml><?xml version="1.0" encoding="utf-8"?>
-<?mso-contentType ?>
-<FormTemplates xmlns="http://schemas.microsoft.com/sharepoint/v3/contenttype/forms">
-  <Display>DocumentLibraryForm</Display>
-  <Edit>DocumentLibraryForm</Edit>
-  <New>DocumentLibraryForm</New>
-</FormTemplates>
-</file>
-
-<file path=customXml/item3.xml><?xml version="1.0" encoding="utf-8"?>
-<p:properties xmlns:p="http://schemas.microsoft.com/office/2006/metadata/properties" xmlns:xsi="http://www.w3.org/2001/XMLSchema-instance">
-  <documentManagement/>
-</p:properties>
-</file>
-
-<file path=customXml/item4.xml><?xml version="1.0" encoding="utf-8"?>
 <outs:outSpaceData xmlns:outs="http://schemas.microsoft.com/office/2009/outspace/metadata">
   <outs:relatedDates>
     <outs:relatedDate>
@@ -8422,6 +9146,21 @@
 </outs:outSpaceData>
 </file>
 
+<file path=customXml/item3.xml><?xml version="1.0" encoding="utf-8"?>
+<p:properties xmlns:p="http://schemas.microsoft.com/office/2006/metadata/properties" xmlns:xsi="http://www.w3.org/2001/XMLSchema-instance">
+  <documentManagement/>
+</p:properties>
+</file>
+
+<file path=customXml/item4.xml><?xml version="1.0" encoding="utf-8"?>
+<?mso-contentType ?>
+<FormTemplates xmlns="http://schemas.microsoft.com/sharepoint/v3/contenttype/forms">
+  <Display>DocumentLibraryForm</Display>
+  <Edit>DocumentLibraryForm</Edit>
+  <New>DocumentLibraryForm</New>
+</FormTemplates>
+</file>
+
 <file path=customXml/itemProps1.xml><?xml version="1.0" encoding="utf-8"?>
 <ds:datastoreItem xmlns:ds="http://schemas.openxmlformats.org/officeDocument/2006/customXml" ds:itemID="{63F8C001-70B3-4AE4-BEC2-202AE4E30C7A}">
   <ds:schemaRefs>
@@ -8439,9 +9178,9 @@
 </file>
 
 <file path=customXml/itemProps2.xml><?xml version="1.0" encoding="utf-8"?>
-<ds:datastoreItem xmlns:ds="http://schemas.openxmlformats.org/officeDocument/2006/customXml" ds:itemID="{6034B84F-8F8E-48B7-9EFF-C7DE1A66BD73}">
+<ds:datastoreItem xmlns:ds="http://schemas.openxmlformats.org/officeDocument/2006/customXml" ds:itemID="{8865FC99-B6BD-4E98-8312-F4F432C217EA}">
   <ds:schemaRefs>
-    <ds:schemaRef ds:uri="http://schemas.microsoft.com/sharepoint/v3/contenttype/forms"/>
+    <ds:schemaRef ds:uri="http://schemas.microsoft.com/office/2009/outspace/metadata"/>
   </ds:schemaRefs>
 </ds:datastoreItem>
 </file>
@@ -8462,9 +9201,9 @@
 </file>
 
 <file path=customXml/itemProps4.xml><?xml version="1.0" encoding="utf-8"?>
-<ds:datastoreItem xmlns:ds="http://schemas.openxmlformats.org/officeDocument/2006/customXml" ds:itemID="{8865FC99-B6BD-4E98-8312-F4F432C217EA}">
+<ds:datastoreItem xmlns:ds="http://schemas.openxmlformats.org/officeDocument/2006/customXml" ds:itemID="{6034B84F-8F8E-48B7-9EFF-C7DE1A66BD73}">
   <ds:schemaRefs>
-    <ds:schemaRef ds:uri="http://schemas.microsoft.com/office/2009/outspace/metadata"/>
+    <ds:schemaRef ds:uri="http://schemas.microsoft.com/sharepoint/v3/contenttype/forms"/>
   </ds:schemaRefs>
 </ds:datastoreItem>
 </file>
</xml_diff>